<commit_message>
Add AppHost project and implement caching endpoints; include service defaults and health checks
</commit_message>
<xml_diff>
--- a/demo/HybridCache/Hybrid Cache.pptx
+++ b/demo/HybridCache/Hybrid Cache.pptx
@@ -107,6 +107,11 @@
       </a:defRPr>
     </a:lvl9pPr>
   </p:defaultTextStyle>
+  <p:extLst>
+    <p:ext uri="{EFAFB233-063F-42B5-8137-9DF3F51BA10A}">
+      <p15:sldGuideLst xmlns:p15="http://schemas.microsoft.com/office/powerpoint/2012/main"/>
+    </p:ext>
+  </p:extLst>
 </p:presentation>
 </file>
 
@@ -259,7 +264,7 @@
           <a:p>
             <a:fld id="{E52FC3BF-D043-4C0D-98F3-CC294C676DE3}" type="datetimeFigureOut">
               <a:rPr lang="en-DE" smtClean="0"/>
-              <a:t>09/05/2025</a:t>
+              <a:t>14/05/2025</a:t>
             </a:fld>
             <a:endParaRPr lang="en-DE"/>
           </a:p>
@@ -459,7 +464,7 @@
           <a:p>
             <a:fld id="{E52FC3BF-D043-4C0D-98F3-CC294C676DE3}" type="datetimeFigureOut">
               <a:rPr lang="en-DE" smtClean="0"/>
-              <a:t>09/05/2025</a:t>
+              <a:t>14/05/2025</a:t>
             </a:fld>
             <a:endParaRPr lang="en-DE"/>
           </a:p>
@@ -669,7 +674,7 @@
           <a:p>
             <a:fld id="{E52FC3BF-D043-4C0D-98F3-CC294C676DE3}" type="datetimeFigureOut">
               <a:rPr lang="en-DE" smtClean="0"/>
-              <a:t>09/05/2025</a:t>
+              <a:t>14/05/2025</a:t>
             </a:fld>
             <a:endParaRPr lang="en-DE"/>
           </a:p>
@@ -869,7 +874,7 @@
           <a:p>
             <a:fld id="{E52FC3BF-D043-4C0D-98F3-CC294C676DE3}" type="datetimeFigureOut">
               <a:rPr lang="en-DE" smtClean="0"/>
-              <a:t>09/05/2025</a:t>
+              <a:t>14/05/2025</a:t>
             </a:fld>
             <a:endParaRPr lang="en-DE"/>
           </a:p>
@@ -1145,7 +1150,7 @@
           <a:p>
             <a:fld id="{E52FC3BF-D043-4C0D-98F3-CC294C676DE3}" type="datetimeFigureOut">
               <a:rPr lang="en-DE" smtClean="0"/>
-              <a:t>09/05/2025</a:t>
+              <a:t>14/05/2025</a:t>
             </a:fld>
             <a:endParaRPr lang="en-DE"/>
           </a:p>
@@ -1413,7 +1418,7 @@
           <a:p>
             <a:fld id="{E52FC3BF-D043-4C0D-98F3-CC294C676DE3}" type="datetimeFigureOut">
               <a:rPr lang="en-DE" smtClean="0"/>
-              <a:t>09/05/2025</a:t>
+              <a:t>14/05/2025</a:t>
             </a:fld>
             <a:endParaRPr lang="en-DE"/>
           </a:p>
@@ -1828,7 +1833,7 @@
           <a:p>
             <a:fld id="{E52FC3BF-D043-4C0D-98F3-CC294C676DE3}" type="datetimeFigureOut">
               <a:rPr lang="en-DE" smtClean="0"/>
-              <a:t>09/05/2025</a:t>
+              <a:t>14/05/2025</a:t>
             </a:fld>
             <a:endParaRPr lang="en-DE"/>
           </a:p>
@@ -1970,7 +1975,7 @@
           <a:p>
             <a:fld id="{E52FC3BF-D043-4C0D-98F3-CC294C676DE3}" type="datetimeFigureOut">
               <a:rPr lang="en-DE" smtClean="0"/>
-              <a:t>09/05/2025</a:t>
+              <a:t>14/05/2025</a:t>
             </a:fld>
             <a:endParaRPr lang="en-DE"/>
           </a:p>
@@ -2083,7 +2088,7 @@
           <a:p>
             <a:fld id="{E52FC3BF-D043-4C0D-98F3-CC294C676DE3}" type="datetimeFigureOut">
               <a:rPr lang="en-DE" smtClean="0"/>
-              <a:t>09/05/2025</a:t>
+              <a:t>14/05/2025</a:t>
             </a:fld>
             <a:endParaRPr lang="en-DE"/>
           </a:p>
@@ -2396,7 +2401,7 @@
           <a:p>
             <a:fld id="{E52FC3BF-D043-4C0D-98F3-CC294C676DE3}" type="datetimeFigureOut">
               <a:rPr lang="en-DE" smtClean="0"/>
-              <a:t>09/05/2025</a:t>
+              <a:t>14/05/2025</a:t>
             </a:fld>
             <a:endParaRPr lang="en-DE"/>
           </a:p>
@@ -2685,7 +2690,7 @@
           <a:p>
             <a:fld id="{E52FC3BF-D043-4C0D-98F3-CC294C676DE3}" type="datetimeFigureOut">
               <a:rPr lang="en-DE" smtClean="0"/>
-              <a:t>09/05/2025</a:t>
+              <a:t>14/05/2025</a:t>
             </a:fld>
             <a:endParaRPr lang="en-DE"/>
           </a:p>
@@ -2928,7 +2933,7 @@
           <a:p>
             <a:fld id="{E52FC3BF-D043-4C0D-98F3-CC294C676DE3}" type="datetimeFigureOut">
               <a:rPr lang="en-DE" smtClean="0"/>
-              <a:t>09/05/2025</a:t>
+              <a:t>14/05/2025</a:t>
             </a:fld>
             <a:endParaRPr lang="en-DE"/>
           </a:p>
@@ -12961,7 +12966,7 @@
                 <a:ea typeface="+mj-ea"/>
                 <a:cs typeface="+mj-cs"/>
               </a:rPr>
-              <a:t>No-Cache to Hybrid-Cache</a:t>
+              <a:t>From No-Cache to Hybrid-Cache</a:t>
             </a:r>
           </a:p>
         </p:txBody>
@@ -15489,6 +15494,88 @@
           </a:p>
         </p:txBody>
       </p:sp>
+      <p:sp>
+        <p:nvSpPr>
+          <p:cNvPr id="2" name="Arrow: Right 1">
+            <a:extLst>
+              <a:ext uri="{FF2B5EF4-FFF2-40B4-BE49-F238E27FC236}">
+                <a16:creationId xmlns:a16="http://schemas.microsoft.com/office/drawing/2014/main" id="{F7CD0DC1-17B2-8BEC-F03F-2C62EE45D8A0}"/>
+              </a:ext>
+            </a:extLst>
+          </p:cNvPr>
+          <p:cNvSpPr/>
+          <p:nvPr/>
+        </p:nvSpPr>
+        <p:spPr>
+          <a:xfrm>
+            <a:off x="353226" y="5123772"/>
+            <a:ext cx="11485548" cy="177550"/>
+          </a:xfrm>
+          <a:prstGeom prst="rightArrow">
+            <a:avLst/>
+          </a:prstGeom>
+          <a:gradFill>
+            <a:gsLst>
+              <a:gs pos="0">
+                <a:schemeClr val="tx2">
+                  <a:lumMod val="50000"/>
+                  <a:lumOff val="50000"/>
+                </a:schemeClr>
+              </a:gs>
+              <a:gs pos="100000">
+                <a:schemeClr val="accent6">
+                  <a:lumMod val="60000"/>
+                  <a:lumOff val="40000"/>
+                </a:schemeClr>
+              </a:gs>
+            </a:gsLst>
+            <a:lin ang="0" scaled="0"/>
+          </a:gradFill>
+          <a:ln>
+            <a:gradFill>
+              <a:gsLst>
+                <a:gs pos="0">
+                  <a:schemeClr val="tx2">
+                    <a:lumMod val="50000"/>
+                    <a:lumOff val="50000"/>
+                  </a:schemeClr>
+                </a:gs>
+                <a:gs pos="100000">
+                  <a:schemeClr val="accent6">
+                    <a:lumMod val="60000"/>
+                    <a:lumOff val="40000"/>
+                  </a:schemeClr>
+                </a:gs>
+              </a:gsLst>
+              <a:lin ang="0" scaled="0"/>
+            </a:gradFill>
+          </a:ln>
+        </p:spPr>
+        <p:style>
+          <a:lnRef idx="2">
+            <a:schemeClr val="accent2">
+              <a:shade val="15000"/>
+            </a:schemeClr>
+          </a:lnRef>
+          <a:fillRef idx="1">
+            <a:schemeClr val="accent2"/>
+          </a:fillRef>
+          <a:effectRef idx="0">
+            <a:schemeClr val="accent2"/>
+          </a:effectRef>
+          <a:fontRef idx="minor">
+            <a:schemeClr val="lt1"/>
+          </a:fontRef>
+        </p:style>
+        <p:txBody>
+          <a:bodyPr rtlCol="0" anchor="ctr"/>
+          <a:lstStyle/>
+          <a:p>
+            <a:pPr algn="ctr"/>
+            <a:endParaRPr lang="en-DE"/>
+          </a:p>
+        </p:txBody>
+      </p:sp>
     </p:spTree>
     <p:extLst>
       <p:ext uri="{BB962C8B-B14F-4D97-AF65-F5344CB8AC3E}">
@@ -15694,7 +15781,7 @@
                 <a:ea typeface="+mj-ea"/>
                 <a:cs typeface="+mj-cs"/>
               </a:rPr>
-              <a:t>No-Cache to Hybrid-Cache</a:t>
+              <a:t>Process and Architecture</a:t>
             </a:r>
           </a:p>
         </p:txBody>

</xml_diff>